<commit_message>
weekly update: add f1c100s
</commit_message>
<xml_diff>
--- a/source/vsf/documents/design/design_memo.pptx
+++ b/source/vsf/documents/design/design_memo.pptx
@@ -244,7 +244,7 @@
           <a:p>
             <a:fld id="{9354F68C-8213-4CA4-84EB-EFCFBA0D9D02}" type="datetimeFigureOut">
               <a:rPr lang="en-GB" smtClean="0"/>
-              <a:t>29/05/2020</a:t>
+              <a:t>28/06/2020</a:t>
             </a:fld>
             <a:endParaRPr lang="en-GB"/>
           </a:p>
@@ -409,7 +409,7 @@
           <a:p>
             <a:fld id="{9354F68C-8213-4CA4-84EB-EFCFBA0D9D02}" type="datetimeFigureOut">
               <a:rPr lang="en-GB" smtClean="0"/>
-              <a:t>29/05/2020</a:t>
+              <a:t>28/06/2020</a:t>
             </a:fld>
             <a:endParaRPr lang="en-GB"/>
           </a:p>
@@ -584,7 +584,7 @@
           <a:p>
             <a:fld id="{9354F68C-8213-4CA4-84EB-EFCFBA0D9D02}" type="datetimeFigureOut">
               <a:rPr lang="en-GB" smtClean="0"/>
-              <a:t>29/05/2020</a:t>
+              <a:t>28/06/2020</a:t>
             </a:fld>
             <a:endParaRPr lang="en-GB"/>
           </a:p>
@@ -749,7 +749,7 @@
           <a:p>
             <a:fld id="{9354F68C-8213-4CA4-84EB-EFCFBA0D9D02}" type="datetimeFigureOut">
               <a:rPr lang="en-GB" smtClean="0"/>
-              <a:t>29/05/2020</a:t>
+              <a:t>28/06/2020</a:t>
             </a:fld>
             <a:endParaRPr lang="en-GB"/>
           </a:p>
@@ -990,7 +990,7 @@
           <a:p>
             <a:fld id="{9354F68C-8213-4CA4-84EB-EFCFBA0D9D02}" type="datetimeFigureOut">
               <a:rPr lang="en-GB" smtClean="0"/>
-              <a:t>29/05/2020</a:t>
+              <a:t>28/06/2020</a:t>
             </a:fld>
             <a:endParaRPr lang="en-GB"/>
           </a:p>
@@ -1217,7 +1217,7 @@
           <a:p>
             <a:fld id="{9354F68C-8213-4CA4-84EB-EFCFBA0D9D02}" type="datetimeFigureOut">
               <a:rPr lang="en-GB" smtClean="0"/>
-              <a:t>29/05/2020</a:t>
+              <a:t>28/06/2020</a:t>
             </a:fld>
             <a:endParaRPr lang="en-GB"/>
           </a:p>
@@ -1579,7 +1579,7 @@
           <a:p>
             <a:fld id="{9354F68C-8213-4CA4-84EB-EFCFBA0D9D02}" type="datetimeFigureOut">
               <a:rPr lang="en-GB" smtClean="0"/>
-              <a:t>29/05/2020</a:t>
+              <a:t>28/06/2020</a:t>
             </a:fld>
             <a:endParaRPr lang="en-GB"/>
           </a:p>
@@ -1692,7 +1692,7 @@
           <a:p>
             <a:fld id="{9354F68C-8213-4CA4-84EB-EFCFBA0D9D02}" type="datetimeFigureOut">
               <a:rPr lang="en-GB" smtClean="0"/>
-              <a:t>29/05/2020</a:t>
+              <a:t>28/06/2020</a:t>
             </a:fld>
             <a:endParaRPr lang="en-GB"/>
           </a:p>
@@ -1782,7 +1782,7 @@
           <a:p>
             <a:fld id="{9354F68C-8213-4CA4-84EB-EFCFBA0D9D02}" type="datetimeFigureOut">
               <a:rPr lang="en-GB" smtClean="0"/>
-              <a:t>29/05/2020</a:t>
+              <a:t>28/06/2020</a:t>
             </a:fld>
             <a:endParaRPr lang="en-GB"/>
           </a:p>
@@ -2054,7 +2054,7 @@
           <a:p>
             <a:fld id="{9354F68C-8213-4CA4-84EB-EFCFBA0D9D02}" type="datetimeFigureOut">
               <a:rPr lang="en-GB" smtClean="0"/>
-              <a:t>29/05/2020</a:t>
+              <a:t>28/06/2020</a:t>
             </a:fld>
             <a:endParaRPr lang="en-GB"/>
           </a:p>
@@ -2302,7 +2302,7 @@
           <a:p>
             <a:fld id="{9354F68C-8213-4CA4-84EB-EFCFBA0D9D02}" type="datetimeFigureOut">
               <a:rPr lang="en-GB" smtClean="0"/>
-              <a:t>29/05/2020</a:t>
+              <a:t>28/06/2020</a:t>
             </a:fld>
             <a:endParaRPr lang="en-GB"/>
           </a:p>
@@ -2510,7 +2510,7 @@
           <a:p>
             <a:fld id="{9354F68C-8213-4CA4-84EB-EFCFBA0D9D02}" type="datetimeFigureOut">
               <a:rPr lang="en-GB" smtClean="0"/>
-              <a:t>29/05/2020</a:t>
+              <a:t>28/06/2020</a:t>
             </a:fld>
             <a:endParaRPr lang="en-GB"/>
           </a:p>
@@ -2918,8 +2918,8 @@
         </p:nvSpPr>
         <p:spPr>
           <a:xfrm>
-            <a:off x="1026160" y="4505283"/>
-            <a:ext cx="4533900" cy="610750"/>
+            <a:off x="3381587" y="3830121"/>
+            <a:ext cx="2187363" cy="610750"/>
           </a:xfrm>
           <a:prstGeom prst="rect">
             <a:avLst/>
@@ -2994,7 +2994,7 @@
             <a:pPr algn="ctr"/>
             <a:r>
               <a:rPr lang="en-GB" dirty="0"/>
-              <a:t>Components</a:t>
+              <a:t>Component</a:t>
             </a:r>
           </a:p>
         </p:txBody>
@@ -3134,7 +3134,7 @@
             <a:pPr algn="ctr"/>
             <a:r>
               <a:rPr lang="en-GB" dirty="0"/>
-              <a:t>APPLICATIONS</a:t>
+              <a:t>Application</a:t>
             </a:r>
           </a:p>
         </p:txBody>
@@ -3175,7 +3175,7 @@
             <a:pPr algn="ctr"/>
             <a:r>
               <a:rPr lang="en-US" altLang="zh-CN" dirty="0" err="1"/>
-              <a:t>OSA_Services</a:t>
+              <a:t>OSA_Service</a:t>
             </a:r>
             <a:endParaRPr lang="en-US" altLang="zh-CN" dirty="0"/>
           </a:p>
@@ -3183,7 +3183,7 @@
             <a:pPr algn="ctr"/>
             <a:r>
               <a:rPr lang="en-US" dirty="0"/>
-              <a:t>(OS Aware Services)</a:t>
+              <a:t>(OS Aware Service)</a:t>
             </a:r>
             <a:endParaRPr lang="en-GB" dirty="0"/>
           </a:p>
@@ -3250,7 +3250,7 @@
         <p:spPr>
           <a:xfrm>
             <a:off x="1026160" y="3825577"/>
-            <a:ext cx="4533900" cy="610750"/>
+            <a:ext cx="2262505" cy="610750"/>
           </a:xfrm>
           <a:prstGeom prst="rect">
             <a:avLst/>
@@ -3290,7 +3290,7 @@
         </p:nvSpPr>
         <p:spPr>
           <a:xfrm>
-            <a:off x="1026160" y="5181982"/>
+            <a:off x="1035050" y="4505282"/>
             <a:ext cx="4533900" cy="610750"/>
           </a:xfrm>
           <a:prstGeom prst="rect">
@@ -3331,7 +3331,7 @@
         </p:nvSpPr>
         <p:spPr>
           <a:xfrm>
-            <a:off x="6002868" y="5164294"/>
+            <a:off x="6002868" y="4456647"/>
             <a:ext cx="5774266" cy="615553"/>
           </a:xfrm>
           <a:prstGeom prst="rect">
@@ -3353,7 +3353,7 @@
                 <a:latin typeface="幼圆" panose="02010509060101010101" pitchFamily="49" charset="-122"/>
                 <a:ea typeface="幼圆" panose="02010509060101010101" pitchFamily="49" charset="-122"/>
               </a:rPr>
-              <a:t>硬件无关的软件基础设施</a:t>
+              <a:t>编译器相关、或者硬件无关的软件基础设施</a:t>
             </a:r>
             <a:r>
               <a:rPr lang="zh-CN" altLang="en-US" sz="1200" dirty="0">
@@ -3468,7 +3468,7 @@
         </p:nvSpPr>
         <p:spPr>
           <a:xfrm>
-            <a:off x="6002868" y="3992452"/>
+            <a:off x="6002868" y="3853953"/>
             <a:ext cx="5774266" cy="276999"/>
           </a:xfrm>
           <a:prstGeom prst="rect">
@@ -3521,7 +3521,7 @@
         </p:nvSpPr>
         <p:spPr>
           <a:xfrm>
-            <a:off x="6002868" y="4672158"/>
+            <a:off x="6002868" y="4103672"/>
             <a:ext cx="5774266" cy="276999"/>
           </a:xfrm>
           <a:prstGeom prst="rect">
@@ -3827,7 +3827,7 @@
         </p:nvSpPr>
         <p:spPr>
           <a:xfrm>
-            <a:off x="6002868" y="1802407"/>
+            <a:off x="6002868" y="1740566"/>
             <a:ext cx="5774266" cy="276999"/>
           </a:xfrm>
           <a:prstGeom prst="rect">
@@ -3880,7 +3880,7 @@
         </p:nvSpPr>
         <p:spPr>
           <a:xfrm>
-            <a:off x="6002868" y="2079406"/>
+            <a:off x="6002868" y="1977716"/>
             <a:ext cx="5774266" cy="430887"/>
           </a:xfrm>
           <a:prstGeom prst="rect">
@@ -4193,6 +4193,146 @@
               <a:t>用户应用层</a:t>
             </a:r>
             <a:endParaRPr lang="en-GB" altLang="zh-CN" sz="1000" dirty="0">
+              <a:latin typeface="幼圆" panose="02010509060101010101" pitchFamily="49" charset="-122"/>
+              <a:ea typeface="幼圆" panose="02010509060101010101" pitchFamily="49" charset="-122"/>
+            </a:endParaRPr>
+          </a:p>
+        </p:txBody>
+      </p:sp>
+      <p:sp>
+        <p:nvSpPr>
+          <p:cNvPr id="26" name="TextBox 25">
+            <a:extLst>
+              <a:ext uri="{FF2B5EF4-FFF2-40B4-BE49-F238E27FC236}">
+                <a16:creationId xmlns:a16="http://schemas.microsoft.com/office/drawing/2014/main" id="{CC11207A-7762-4BD3-AE31-726A779D9F2C}"/>
+              </a:ext>
+            </a:extLst>
+          </p:cNvPr>
+          <p:cNvSpPr txBox="1"/>
+          <p:nvPr/>
+        </p:nvSpPr>
+        <p:spPr>
+          <a:xfrm>
+            <a:off x="1026159" y="5393216"/>
+            <a:ext cx="10674773" cy="415498"/>
+          </a:xfrm>
+          <a:prstGeom prst="rect">
+            <a:avLst/>
+          </a:prstGeom>
+          <a:noFill/>
+        </p:spPr>
+        <p:txBody>
+          <a:bodyPr wrap="square" rtlCol="0">
+            <a:spAutoFit/>
+          </a:bodyPr>
+          <a:lstStyle/>
+          <a:p>
+            <a:r>
+              <a:rPr lang="zh-CN" altLang="en-US" sz="1050" dirty="0">
+                <a:latin typeface="幼圆" panose="02010509060101010101" pitchFamily="49" charset="-122"/>
+                <a:ea typeface="幼圆" panose="02010509060101010101" pitchFamily="49" charset="-122"/>
+              </a:rPr>
+              <a:t>注意：虽然</a:t>
+            </a:r>
+            <a:r>
+              <a:rPr lang="en-GB" altLang="zh-CN" sz="1050" dirty="0">
+                <a:latin typeface="幼圆" panose="02010509060101010101" pitchFamily="49" charset="-122"/>
+                <a:ea typeface="幼圆" panose="02010509060101010101" pitchFamily="49" charset="-122"/>
+              </a:rPr>
+              <a:t>Service</a:t>
+            </a:r>
+            <a:r>
+              <a:rPr lang="zh-CN" altLang="en-US" sz="1050" dirty="0">
+                <a:latin typeface="幼圆" panose="02010509060101010101" pitchFamily="49" charset="-122"/>
+                <a:ea typeface="幼圆" panose="02010509060101010101" pitchFamily="49" charset="-122"/>
+              </a:rPr>
+              <a:t>和</a:t>
+            </a:r>
+            <a:r>
+              <a:rPr lang="en-GB" altLang="zh-CN" sz="1050" dirty="0">
+                <a:latin typeface="幼圆" panose="02010509060101010101" pitchFamily="49" charset="-122"/>
+                <a:ea typeface="幼圆" panose="02010509060101010101" pitchFamily="49" charset="-122"/>
+              </a:rPr>
+              <a:t>HAL</a:t>
+            </a:r>
+            <a:r>
+              <a:rPr lang="zh-CN" altLang="en-US" sz="1050" dirty="0">
+                <a:latin typeface="幼圆" panose="02010509060101010101" pitchFamily="49" charset="-122"/>
+                <a:ea typeface="幼圆" panose="02010509060101010101" pitchFamily="49" charset="-122"/>
+              </a:rPr>
+              <a:t>处于平级关系，但是由于</a:t>
+            </a:r>
+            <a:r>
+              <a:rPr lang="en-GB" altLang="zh-CN" sz="1050" dirty="0">
+                <a:latin typeface="幼圆" panose="02010509060101010101" pitchFamily="49" charset="-122"/>
+                <a:ea typeface="幼圆" panose="02010509060101010101" pitchFamily="49" charset="-122"/>
+              </a:rPr>
+              <a:t>Service</a:t>
+            </a:r>
+            <a:r>
+              <a:rPr lang="zh-CN" altLang="en-US" sz="1050" dirty="0">
+                <a:latin typeface="幼圆" panose="02010509060101010101" pitchFamily="49" charset="-122"/>
+                <a:ea typeface="幼圆" panose="02010509060101010101" pitchFamily="49" charset="-122"/>
+              </a:rPr>
+              <a:t>本身的定义要求硬件无关，因此</a:t>
+            </a:r>
+            <a:r>
+              <a:rPr lang="en-GB" altLang="zh-CN" sz="1050" dirty="0">
+                <a:latin typeface="幼圆" panose="02010509060101010101" pitchFamily="49" charset="-122"/>
+                <a:ea typeface="幼圆" panose="02010509060101010101" pitchFamily="49" charset="-122"/>
+              </a:rPr>
+              <a:t>Service</a:t>
+            </a:r>
+            <a:r>
+              <a:rPr lang="zh-CN" altLang="en-US" sz="1050" dirty="0">
+                <a:latin typeface="幼圆" panose="02010509060101010101" pitchFamily="49" charset="-122"/>
+                <a:ea typeface="幼圆" panose="02010509060101010101" pitchFamily="49" charset="-122"/>
+              </a:rPr>
+              <a:t>并不允许产生任何对</a:t>
+            </a:r>
+            <a:r>
+              <a:rPr lang="en-GB" altLang="zh-CN" sz="1050" dirty="0">
+                <a:latin typeface="幼圆" panose="02010509060101010101" pitchFamily="49" charset="-122"/>
+                <a:ea typeface="幼圆" panose="02010509060101010101" pitchFamily="49" charset="-122"/>
+              </a:rPr>
+              <a:t>HAL</a:t>
+            </a:r>
+            <a:r>
+              <a:rPr lang="zh-CN" altLang="en-US" sz="1050" dirty="0">
+                <a:latin typeface="幼圆" panose="02010509060101010101" pitchFamily="49" charset="-122"/>
+                <a:ea typeface="幼圆" panose="02010509060101010101" pitchFamily="49" charset="-122"/>
+              </a:rPr>
+              <a:t>的平级依赖。</a:t>
+            </a:r>
+            <a:r>
+              <a:rPr lang="en-GB" altLang="zh-CN" sz="1050" dirty="0">
+                <a:latin typeface="幼圆" panose="02010509060101010101" pitchFamily="49" charset="-122"/>
+                <a:ea typeface="幼圆" panose="02010509060101010101" pitchFamily="49" charset="-122"/>
+              </a:rPr>
+              <a:t>HAL</a:t>
+            </a:r>
+            <a:r>
+              <a:rPr lang="zh-CN" altLang="en-US" sz="1050" dirty="0">
+                <a:latin typeface="幼圆" panose="02010509060101010101" pitchFamily="49" charset="-122"/>
+                <a:ea typeface="幼圆" panose="02010509060101010101" pitchFamily="49" charset="-122"/>
+              </a:rPr>
+              <a:t>则可以根据平级调用原则使用和依赖</a:t>
+            </a:r>
+            <a:r>
+              <a:rPr lang="en-GB" altLang="zh-CN" sz="1050" dirty="0">
+                <a:latin typeface="幼圆" panose="02010509060101010101" pitchFamily="49" charset="-122"/>
+                <a:ea typeface="幼圆" panose="02010509060101010101" pitchFamily="49" charset="-122"/>
+              </a:rPr>
+              <a:t>Service</a:t>
+            </a:r>
+            <a:r>
+              <a:rPr lang="zh-CN" altLang="en-US" sz="1050" dirty="0">
+                <a:latin typeface="幼圆" panose="02010509060101010101" pitchFamily="49" charset="-122"/>
+                <a:ea typeface="幼圆" panose="02010509060101010101" pitchFamily="49" charset="-122"/>
+              </a:rPr>
+              <a:t>层中的各类模块和服务。</a:t>
+            </a:r>
+            <a:endParaRPr lang="en-GB" sz="1200" dirty="0">
               <a:latin typeface="幼圆" panose="02010509060101010101" pitchFamily="49" charset="-122"/>
               <a:ea typeface="幼圆" panose="02010509060101010101" pitchFamily="49" charset="-122"/>
             </a:endParaRPr>

</xml_diff>